<commit_message>
Pure substances portion added
</commit_message>
<xml_diff>
--- a/THERMODYNAMICS SHORTNOTES/Thermo Revision.pptx
+++ b/THERMODYNAMICS SHORTNOTES/Thermo Revision.pptx
@@ -11,6 +11,7 @@
     <p:sldId id="259" r:id="rId5"/>
     <p:sldId id="260" r:id="rId6"/>
     <p:sldId id="261" r:id="rId7"/>
+    <p:sldId id="262" r:id="rId8"/>
   </p:sldIdLst>
   <p:sldSz cx="12192000" cy="6858000"/>
   <p:notesSz cx="6858000" cy="9144000"/>
@@ -266,7 +267,7 @@
           <a:p>
             <a:fld id="{ED9CB403-B843-48A6-8662-3D0CEC75C9C1}" type="datetimeFigureOut">
               <a:rPr lang="en-IN" smtClean="0"/>
-              <a:t>23-01-2023</a:t>
+              <a:t>25-01-2023</a:t>
             </a:fld>
             <a:endParaRPr lang="en-IN"/>
           </a:p>
@@ -466,7 +467,7 @@
           <a:p>
             <a:fld id="{ED9CB403-B843-48A6-8662-3D0CEC75C9C1}" type="datetimeFigureOut">
               <a:rPr lang="en-IN" smtClean="0"/>
-              <a:t>23-01-2023</a:t>
+              <a:t>25-01-2023</a:t>
             </a:fld>
             <a:endParaRPr lang="en-IN"/>
           </a:p>
@@ -676,7 +677,7 @@
           <a:p>
             <a:fld id="{ED9CB403-B843-48A6-8662-3D0CEC75C9C1}" type="datetimeFigureOut">
               <a:rPr lang="en-IN" smtClean="0"/>
-              <a:t>23-01-2023</a:t>
+              <a:t>25-01-2023</a:t>
             </a:fld>
             <a:endParaRPr lang="en-IN"/>
           </a:p>
@@ -876,7 +877,7 @@
           <a:p>
             <a:fld id="{ED9CB403-B843-48A6-8662-3D0CEC75C9C1}" type="datetimeFigureOut">
               <a:rPr lang="en-IN" smtClean="0"/>
-              <a:t>23-01-2023</a:t>
+              <a:t>25-01-2023</a:t>
             </a:fld>
             <a:endParaRPr lang="en-IN"/>
           </a:p>
@@ -1152,7 +1153,7 @@
           <a:p>
             <a:fld id="{ED9CB403-B843-48A6-8662-3D0CEC75C9C1}" type="datetimeFigureOut">
               <a:rPr lang="en-IN" smtClean="0"/>
-              <a:t>23-01-2023</a:t>
+              <a:t>25-01-2023</a:t>
             </a:fld>
             <a:endParaRPr lang="en-IN"/>
           </a:p>
@@ -1420,7 +1421,7 @@
           <a:p>
             <a:fld id="{ED9CB403-B843-48A6-8662-3D0CEC75C9C1}" type="datetimeFigureOut">
               <a:rPr lang="en-IN" smtClean="0"/>
-              <a:t>23-01-2023</a:t>
+              <a:t>25-01-2023</a:t>
             </a:fld>
             <a:endParaRPr lang="en-IN"/>
           </a:p>
@@ -1835,7 +1836,7 @@
           <a:p>
             <a:fld id="{ED9CB403-B843-48A6-8662-3D0CEC75C9C1}" type="datetimeFigureOut">
               <a:rPr lang="en-IN" smtClean="0"/>
-              <a:t>23-01-2023</a:t>
+              <a:t>25-01-2023</a:t>
             </a:fld>
             <a:endParaRPr lang="en-IN"/>
           </a:p>
@@ -1977,7 +1978,7 @@
           <a:p>
             <a:fld id="{ED9CB403-B843-48A6-8662-3D0CEC75C9C1}" type="datetimeFigureOut">
               <a:rPr lang="en-IN" smtClean="0"/>
-              <a:t>23-01-2023</a:t>
+              <a:t>25-01-2023</a:t>
             </a:fld>
             <a:endParaRPr lang="en-IN"/>
           </a:p>
@@ -2090,7 +2091,7 @@
           <a:p>
             <a:fld id="{ED9CB403-B843-48A6-8662-3D0CEC75C9C1}" type="datetimeFigureOut">
               <a:rPr lang="en-IN" smtClean="0"/>
-              <a:t>23-01-2023</a:t>
+              <a:t>25-01-2023</a:t>
             </a:fld>
             <a:endParaRPr lang="en-IN"/>
           </a:p>
@@ -2403,7 +2404,7 @@
           <a:p>
             <a:fld id="{ED9CB403-B843-48A6-8662-3D0CEC75C9C1}" type="datetimeFigureOut">
               <a:rPr lang="en-IN" smtClean="0"/>
-              <a:t>23-01-2023</a:t>
+              <a:t>25-01-2023</a:t>
             </a:fld>
             <a:endParaRPr lang="en-IN"/>
           </a:p>
@@ -2692,7 +2693,7 @@
           <a:p>
             <a:fld id="{ED9CB403-B843-48A6-8662-3D0CEC75C9C1}" type="datetimeFigureOut">
               <a:rPr lang="en-IN" smtClean="0"/>
-              <a:t>23-01-2023</a:t>
+              <a:t>25-01-2023</a:t>
             </a:fld>
             <a:endParaRPr lang="en-IN"/>
           </a:p>
@@ -2935,7 +2936,7 @@
           <a:p>
             <a:fld id="{ED9CB403-B843-48A6-8662-3D0CEC75C9C1}" type="datetimeFigureOut">
               <a:rPr lang="en-IN" smtClean="0"/>
-              <a:t>23-01-2023</a:t>
+              <a:t>25-01-2023</a:t>
             </a:fld>
             <a:endParaRPr lang="en-IN"/>
           </a:p>
@@ -10193,6 +10194,2273 @@
 </p:sld>
 </file>
 
+<file path=ppt/slides/slide7.xml><?xml version="1.0" encoding="utf-8"?>
+<p:sld xmlns:a="http://schemas.openxmlformats.org/drawingml/2006/main" xmlns:r="http://schemas.openxmlformats.org/officeDocument/2006/relationships" xmlns:p="http://schemas.openxmlformats.org/presentationml/2006/main">
+  <p:cSld>
+    <p:spTree>
+      <p:nvGrpSpPr>
+        <p:cNvPr id="1" name=""/>
+        <p:cNvGrpSpPr/>
+        <p:nvPr/>
+      </p:nvGrpSpPr>
+      <p:grpSpPr>
+        <a:xfrm>
+          <a:off x="0" y="0"/>
+          <a:ext cx="0" cy="0"/>
+          <a:chOff x="0" y="0"/>
+          <a:chExt cx="0" cy="0"/>
+        </a:xfrm>
+      </p:grpSpPr>
+      <p:sp>
+        <p:nvSpPr>
+          <p:cNvPr id="30" name="Freeform: Shape 29">
+            <a:extLst>
+              <a:ext uri="{FF2B5EF4-FFF2-40B4-BE49-F238E27FC236}">
+                <a16:creationId xmlns:a16="http://schemas.microsoft.com/office/drawing/2014/main" id="{8DAF0450-1818-490A-90A7-D2A43BFE3171}"/>
+              </a:ext>
+            </a:extLst>
+          </p:cNvPr>
+          <p:cNvSpPr/>
+          <p:nvPr/>
+        </p:nvSpPr>
+        <p:spPr>
+          <a:xfrm>
+            <a:off x="5811390" y="1819835"/>
+            <a:ext cx="1476916" cy="3523130"/>
+          </a:xfrm>
+          <a:custGeom>
+            <a:avLst/>
+            <a:gdLst>
+              <a:gd name="connsiteX0" fmla="*/ 1317812 w 1317812"/>
+              <a:gd name="connsiteY0" fmla="*/ 3325906 h 3325906"/>
+              <a:gd name="connsiteX1" fmla="*/ 0 w 1317812"/>
+              <a:gd name="connsiteY1" fmla="*/ 0 h 3325906"/>
+            </a:gdLst>
+            <a:ahLst/>
+            <a:cxnLst>
+              <a:cxn ang="0">
+                <a:pos x="connsiteX0" y="connsiteY0"/>
+              </a:cxn>
+              <a:cxn ang="0">
+                <a:pos x="connsiteX1" y="connsiteY1"/>
+              </a:cxn>
+            </a:cxnLst>
+            <a:rect l="l" t="t" r="r" b="b"/>
+            <a:pathLst>
+              <a:path w="1317812" h="3325906">
+                <a:moveTo>
+                  <a:pt x="1317812" y="3325906"/>
+                </a:moveTo>
+                <a:cubicBezTo>
+                  <a:pt x="832223" y="1928159"/>
+                  <a:pt x="346635" y="530412"/>
+                  <a:pt x="0" y="0"/>
+                </a:cubicBezTo>
+              </a:path>
+            </a:pathLst>
+          </a:custGeom>
+          <a:noFill/>
+          <a:ln w="57150">
+            <a:solidFill>
+              <a:srgbClr val="7030A0"/>
+            </a:solidFill>
+            <a:prstDash val="sysDash"/>
+          </a:ln>
+        </p:spPr>
+        <p:style>
+          <a:lnRef idx="2">
+            <a:schemeClr val="accent1">
+              <a:shade val="50000"/>
+            </a:schemeClr>
+          </a:lnRef>
+          <a:fillRef idx="1">
+            <a:schemeClr val="accent1"/>
+          </a:fillRef>
+          <a:effectRef idx="0">
+            <a:schemeClr val="accent1"/>
+          </a:effectRef>
+          <a:fontRef idx="minor">
+            <a:schemeClr val="lt1"/>
+          </a:fontRef>
+        </p:style>
+        <p:txBody>
+          <a:bodyPr rtlCol="0" anchor="ctr"/>
+          <a:lstStyle/>
+          <a:p>
+            <a:pPr algn="ctr"/>
+            <a:endParaRPr lang="en-IN"/>
+          </a:p>
+        </p:txBody>
+      </p:sp>
+      <p:sp>
+        <p:nvSpPr>
+          <p:cNvPr id="25" name="Freeform: Shape 24">
+            <a:extLst>
+              <a:ext uri="{FF2B5EF4-FFF2-40B4-BE49-F238E27FC236}">
+                <a16:creationId xmlns:a16="http://schemas.microsoft.com/office/drawing/2014/main" id="{3CC057FF-C08E-4E5E-B00F-60109465B713}"/>
+              </a:ext>
+            </a:extLst>
+          </p:cNvPr>
+          <p:cNvSpPr/>
+          <p:nvPr/>
+        </p:nvSpPr>
+        <p:spPr>
+          <a:xfrm>
+            <a:off x="3863788" y="1819835"/>
+            <a:ext cx="1604683" cy="3514165"/>
+          </a:xfrm>
+          <a:custGeom>
+            <a:avLst/>
+            <a:gdLst>
+              <a:gd name="connsiteX0" fmla="*/ 0 w 1604683"/>
+              <a:gd name="connsiteY0" fmla="*/ 3514165 h 3514165"/>
+              <a:gd name="connsiteX1" fmla="*/ 1138518 w 1604683"/>
+              <a:gd name="connsiteY1" fmla="*/ 663389 h 3514165"/>
+              <a:gd name="connsiteX2" fmla="*/ 1604683 w 1604683"/>
+              <a:gd name="connsiteY2" fmla="*/ 0 h 3514165"/>
+            </a:gdLst>
+            <a:ahLst/>
+            <a:cxnLst>
+              <a:cxn ang="0">
+                <a:pos x="connsiteX0" y="connsiteY0"/>
+              </a:cxn>
+              <a:cxn ang="0">
+                <a:pos x="connsiteX1" y="connsiteY1"/>
+              </a:cxn>
+              <a:cxn ang="0">
+                <a:pos x="connsiteX2" y="connsiteY2"/>
+              </a:cxn>
+            </a:cxnLst>
+            <a:rect l="l" t="t" r="r" b="b"/>
+            <a:pathLst>
+              <a:path w="1604683" h="3514165">
+                <a:moveTo>
+                  <a:pt x="0" y="3514165"/>
+                </a:moveTo>
+                <a:cubicBezTo>
+                  <a:pt x="435535" y="2381624"/>
+                  <a:pt x="871071" y="1249083"/>
+                  <a:pt x="1138518" y="663389"/>
+                </a:cubicBezTo>
+                <a:cubicBezTo>
+                  <a:pt x="1405965" y="77695"/>
+                  <a:pt x="1505324" y="38847"/>
+                  <a:pt x="1604683" y="0"/>
+                </a:cubicBezTo>
+              </a:path>
+            </a:pathLst>
+          </a:custGeom>
+          <a:ln w="57150">
+            <a:prstDash val="sysDash"/>
+          </a:ln>
+        </p:spPr>
+        <p:style>
+          <a:lnRef idx="1">
+            <a:schemeClr val="accent4"/>
+          </a:lnRef>
+          <a:fillRef idx="0">
+            <a:schemeClr val="accent4"/>
+          </a:fillRef>
+          <a:effectRef idx="0">
+            <a:schemeClr val="accent4"/>
+          </a:effectRef>
+          <a:fontRef idx="minor">
+            <a:schemeClr val="tx1"/>
+          </a:fontRef>
+        </p:style>
+        <p:txBody>
+          <a:bodyPr rtlCol="0" anchor="ctr"/>
+          <a:lstStyle/>
+          <a:p>
+            <a:pPr algn="ctr"/>
+            <a:endParaRPr lang="en-IN"/>
+          </a:p>
+        </p:txBody>
+      </p:sp>
+      <p:sp>
+        <p:nvSpPr>
+          <p:cNvPr id="19" name="Freeform: Shape 18">
+            <a:extLst>
+              <a:ext uri="{FF2B5EF4-FFF2-40B4-BE49-F238E27FC236}">
+                <a16:creationId xmlns:a16="http://schemas.microsoft.com/office/drawing/2014/main" id="{D20360F0-9545-4530-A57A-6D09AF6C9B8A}"/>
+              </a:ext>
+            </a:extLst>
+          </p:cNvPr>
+          <p:cNvSpPr/>
+          <p:nvPr/>
+        </p:nvSpPr>
+        <p:spPr>
+          <a:xfrm>
+            <a:off x="4046220" y="1943100"/>
+            <a:ext cx="3040399" cy="3489960"/>
+          </a:xfrm>
+          <a:custGeom>
+            <a:avLst/>
+            <a:gdLst>
+              <a:gd name="connsiteX0" fmla="*/ 1539240 w 3040399"/>
+              <a:gd name="connsiteY0" fmla="*/ 0 h 3489960"/>
+              <a:gd name="connsiteX1" fmla="*/ 1661160 w 3040399"/>
+              <a:gd name="connsiteY1" fmla="*/ 76200 h 3489960"/>
+              <a:gd name="connsiteX2" fmla="*/ 1409700 w 3040399"/>
+              <a:gd name="connsiteY2" fmla="*/ 91440 h 3489960"/>
+              <a:gd name="connsiteX3" fmla="*/ 1722120 w 3040399"/>
+              <a:gd name="connsiteY3" fmla="*/ 190500 h 3489960"/>
+              <a:gd name="connsiteX4" fmla="*/ 1325880 w 3040399"/>
+              <a:gd name="connsiteY4" fmla="*/ 213360 h 3489960"/>
+              <a:gd name="connsiteX5" fmla="*/ 1783080 w 3040399"/>
+              <a:gd name="connsiteY5" fmla="*/ 297180 h 3489960"/>
+              <a:gd name="connsiteX6" fmla="*/ 1303020 w 3040399"/>
+              <a:gd name="connsiteY6" fmla="*/ 350520 h 3489960"/>
+              <a:gd name="connsiteX7" fmla="*/ 1836420 w 3040399"/>
+              <a:gd name="connsiteY7" fmla="*/ 426720 h 3489960"/>
+              <a:gd name="connsiteX8" fmla="*/ 1188720 w 3040399"/>
+              <a:gd name="connsiteY8" fmla="*/ 487680 h 3489960"/>
+              <a:gd name="connsiteX9" fmla="*/ 1905000 w 3040399"/>
+              <a:gd name="connsiteY9" fmla="*/ 556260 h 3489960"/>
+              <a:gd name="connsiteX10" fmla="*/ 1135380 w 3040399"/>
+              <a:gd name="connsiteY10" fmla="*/ 609600 h 3489960"/>
+              <a:gd name="connsiteX11" fmla="*/ 1958340 w 3040399"/>
+              <a:gd name="connsiteY11" fmla="*/ 701040 h 3489960"/>
+              <a:gd name="connsiteX12" fmla="*/ 1051560 w 3040399"/>
+              <a:gd name="connsiteY12" fmla="*/ 754380 h 3489960"/>
+              <a:gd name="connsiteX13" fmla="*/ 2065020 w 3040399"/>
+              <a:gd name="connsiteY13" fmla="*/ 853440 h 3489960"/>
+              <a:gd name="connsiteX14" fmla="*/ 975360 w 3040399"/>
+              <a:gd name="connsiteY14" fmla="*/ 929640 h 3489960"/>
+              <a:gd name="connsiteX15" fmla="*/ 2103120 w 3040399"/>
+              <a:gd name="connsiteY15" fmla="*/ 1005840 h 3489960"/>
+              <a:gd name="connsiteX16" fmla="*/ 929640 w 3040399"/>
+              <a:gd name="connsiteY16" fmla="*/ 1112520 h 3489960"/>
+              <a:gd name="connsiteX17" fmla="*/ 2148840 w 3040399"/>
+              <a:gd name="connsiteY17" fmla="*/ 1173480 h 3489960"/>
+              <a:gd name="connsiteX18" fmla="*/ 853440 w 3040399"/>
+              <a:gd name="connsiteY18" fmla="*/ 1280160 h 3489960"/>
+              <a:gd name="connsiteX19" fmla="*/ 2247900 w 3040399"/>
+              <a:gd name="connsiteY19" fmla="*/ 1356360 h 3489960"/>
+              <a:gd name="connsiteX20" fmla="*/ 784860 w 3040399"/>
+              <a:gd name="connsiteY20" fmla="*/ 1432560 h 3489960"/>
+              <a:gd name="connsiteX21" fmla="*/ 2301240 w 3040399"/>
+              <a:gd name="connsiteY21" fmla="*/ 1546860 h 3489960"/>
+              <a:gd name="connsiteX22" fmla="*/ 708660 w 3040399"/>
+              <a:gd name="connsiteY22" fmla="*/ 1630680 h 3489960"/>
+              <a:gd name="connsiteX23" fmla="*/ 2377440 w 3040399"/>
+              <a:gd name="connsiteY23" fmla="*/ 1729740 h 3489960"/>
+              <a:gd name="connsiteX24" fmla="*/ 624840 w 3040399"/>
+              <a:gd name="connsiteY24" fmla="*/ 1844040 h 3489960"/>
+              <a:gd name="connsiteX25" fmla="*/ 2484120 w 3040399"/>
+              <a:gd name="connsiteY25" fmla="*/ 1973580 h 3489960"/>
+              <a:gd name="connsiteX26" fmla="*/ 541020 w 3040399"/>
+              <a:gd name="connsiteY26" fmla="*/ 2095500 h 3489960"/>
+              <a:gd name="connsiteX27" fmla="*/ 2560320 w 3040399"/>
+              <a:gd name="connsiteY27" fmla="*/ 2202180 h 3489960"/>
+              <a:gd name="connsiteX28" fmla="*/ 472440 w 3040399"/>
+              <a:gd name="connsiteY28" fmla="*/ 2286000 h 3489960"/>
+              <a:gd name="connsiteX29" fmla="*/ 2667000 w 3040399"/>
+              <a:gd name="connsiteY29" fmla="*/ 2423160 h 3489960"/>
+              <a:gd name="connsiteX30" fmla="*/ 381000 w 3040399"/>
+              <a:gd name="connsiteY30" fmla="*/ 2468880 h 3489960"/>
+              <a:gd name="connsiteX31" fmla="*/ 2758440 w 3040399"/>
+              <a:gd name="connsiteY31" fmla="*/ 2674620 h 3489960"/>
+              <a:gd name="connsiteX32" fmla="*/ 289560 w 3040399"/>
+              <a:gd name="connsiteY32" fmla="*/ 2743200 h 3489960"/>
+              <a:gd name="connsiteX33" fmla="*/ 2842260 w 3040399"/>
+              <a:gd name="connsiteY33" fmla="*/ 2857500 h 3489960"/>
+              <a:gd name="connsiteX34" fmla="*/ 205740 w 3040399"/>
+              <a:gd name="connsiteY34" fmla="*/ 2964180 h 3489960"/>
+              <a:gd name="connsiteX35" fmla="*/ 2903220 w 3040399"/>
+              <a:gd name="connsiteY35" fmla="*/ 3040380 h 3489960"/>
+              <a:gd name="connsiteX36" fmla="*/ 129540 w 3040399"/>
+              <a:gd name="connsiteY36" fmla="*/ 3162300 h 3489960"/>
+              <a:gd name="connsiteX37" fmla="*/ 2956560 w 3040399"/>
+              <a:gd name="connsiteY37" fmla="*/ 3208020 h 3489960"/>
+              <a:gd name="connsiteX38" fmla="*/ 53340 w 3040399"/>
+              <a:gd name="connsiteY38" fmla="*/ 3337560 h 3489960"/>
+              <a:gd name="connsiteX39" fmla="*/ 3040380 w 3040399"/>
+              <a:gd name="connsiteY39" fmla="*/ 3390900 h 3489960"/>
+              <a:gd name="connsiteX40" fmla="*/ 0 w 3040399"/>
+              <a:gd name="connsiteY40" fmla="*/ 3489960 h 3489960"/>
+            </a:gdLst>
+            <a:ahLst/>
+            <a:cxnLst>
+              <a:cxn ang="0">
+                <a:pos x="connsiteX0" y="connsiteY0"/>
+              </a:cxn>
+              <a:cxn ang="0">
+                <a:pos x="connsiteX1" y="connsiteY1"/>
+              </a:cxn>
+              <a:cxn ang="0">
+                <a:pos x="connsiteX2" y="connsiteY2"/>
+              </a:cxn>
+              <a:cxn ang="0">
+                <a:pos x="connsiteX3" y="connsiteY3"/>
+              </a:cxn>
+              <a:cxn ang="0">
+                <a:pos x="connsiteX4" y="connsiteY4"/>
+              </a:cxn>
+              <a:cxn ang="0">
+                <a:pos x="connsiteX5" y="connsiteY5"/>
+              </a:cxn>
+              <a:cxn ang="0">
+                <a:pos x="connsiteX6" y="connsiteY6"/>
+              </a:cxn>
+              <a:cxn ang="0">
+                <a:pos x="connsiteX7" y="connsiteY7"/>
+              </a:cxn>
+              <a:cxn ang="0">
+                <a:pos x="connsiteX8" y="connsiteY8"/>
+              </a:cxn>
+              <a:cxn ang="0">
+                <a:pos x="connsiteX9" y="connsiteY9"/>
+              </a:cxn>
+              <a:cxn ang="0">
+                <a:pos x="connsiteX10" y="connsiteY10"/>
+              </a:cxn>
+              <a:cxn ang="0">
+                <a:pos x="connsiteX11" y="connsiteY11"/>
+              </a:cxn>
+              <a:cxn ang="0">
+                <a:pos x="connsiteX12" y="connsiteY12"/>
+              </a:cxn>
+              <a:cxn ang="0">
+                <a:pos x="connsiteX13" y="connsiteY13"/>
+              </a:cxn>
+              <a:cxn ang="0">
+                <a:pos x="connsiteX14" y="connsiteY14"/>
+              </a:cxn>
+              <a:cxn ang="0">
+                <a:pos x="connsiteX15" y="connsiteY15"/>
+              </a:cxn>
+              <a:cxn ang="0">
+                <a:pos x="connsiteX16" y="connsiteY16"/>
+              </a:cxn>
+              <a:cxn ang="0">
+                <a:pos x="connsiteX17" y="connsiteY17"/>
+              </a:cxn>
+              <a:cxn ang="0">
+                <a:pos x="connsiteX18" y="connsiteY18"/>
+              </a:cxn>
+              <a:cxn ang="0">
+                <a:pos x="connsiteX19" y="connsiteY19"/>
+              </a:cxn>
+              <a:cxn ang="0">
+                <a:pos x="connsiteX20" y="connsiteY20"/>
+              </a:cxn>
+              <a:cxn ang="0">
+                <a:pos x="connsiteX21" y="connsiteY21"/>
+              </a:cxn>
+              <a:cxn ang="0">
+                <a:pos x="connsiteX22" y="connsiteY22"/>
+              </a:cxn>
+              <a:cxn ang="0">
+                <a:pos x="connsiteX23" y="connsiteY23"/>
+              </a:cxn>
+              <a:cxn ang="0">
+                <a:pos x="connsiteX24" y="connsiteY24"/>
+              </a:cxn>
+              <a:cxn ang="0">
+                <a:pos x="connsiteX25" y="connsiteY25"/>
+              </a:cxn>
+              <a:cxn ang="0">
+                <a:pos x="connsiteX26" y="connsiteY26"/>
+              </a:cxn>
+              <a:cxn ang="0">
+                <a:pos x="connsiteX27" y="connsiteY27"/>
+              </a:cxn>
+              <a:cxn ang="0">
+                <a:pos x="connsiteX28" y="connsiteY28"/>
+              </a:cxn>
+              <a:cxn ang="0">
+                <a:pos x="connsiteX29" y="connsiteY29"/>
+              </a:cxn>
+              <a:cxn ang="0">
+                <a:pos x="connsiteX30" y="connsiteY30"/>
+              </a:cxn>
+              <a:cxn ang="0">
+                <a:pos x="connsiteX31" y="connsiteY31"/>
+              </a:cxn>
+              <a:cxn ang="0">
+                <a:pos x="connsiteX32" y="connsiteY32"/>
+              </a:cxn>
+              <a:cxn ang="0">
+                <a:pos x="connsiteX33" y="connsiteY33"/>
+              </a:cxn>
+              <a:cxn ang="0">
+                <a:pos x="connsiteX34" y="connsiteY34"/>
+              </a:cxn>
+              <a:cxn ang="0">
+                <a:pos x="connsiteX35" y="connsiteY35"/>
+              </a:cxn>
+              <a:cxn ang="0">
+                <a:pos x="connsiteX36" y="connsiteY36"/>
+              </a:cxn>
+              <a:cxn ang="0">
+                <a:pos x="connsiteX37" y="connsiteY37"/>
+              </a:cxn>
+              <a:cxn ang="0">
+                <a:pos x="connsiteX38" y="connsiteY38"/>
+              </a:cxn>
+              <a:cxn ang="0">
+                <a:pos x="connsiteX39" y="connsiteY39"/>
+              </a:cxn>
+              <a:cxn ang="0">
+                <a:pos x="connsiteX40" y="connsiteY40"/>
+              </a:cxn>
+            </a:cxnLst>
+            <a:rect l="l" t="t" r="r" b="b"/>
+            <a:pathLst>
+              <a:path w="3040399" h="3489960">
+                <a:moveTo>
+                  <a:pt x="1539240" y="0"/>
+                </a:moveTo>
+                <a:cubicBezTo>
+                  <a:pt x="1610995" y="30480"/>
+                  <a:pt x="1682750" y="60960"/>
+                  <a:pt x="1661160" y="76200"/>
+                </a:cubicBezTo>
+                <a:cubicBezTo>
+                  <a:pt x="1639570" y="91440"/>
+                  <a:pt x="1399540" y="72390"/>
+                  <a:pt x="1409700" y="91440"/>
+                </a:cubicBezTo>
+                <a:cubicBezTo>
+                  <a:pt x="1419860" y="110490"/>
+                  <a:pt x="1736090" y="170180"/>
+                  <a:pt x="1722120" y="190500"/>
+                </a:cubicBezTo>
+                <a:cubicBezTo>
+                  <a:pt x="1708150" y="210820"/>
+                  <a:pt x="1315720" y="195580"/>
+                  <a:pt x="1325880" y="213360"/>
+                </a:cubicBezTo>
+                <a:cubicBezTo>
+                  <a:pt x="1336040" y="231140"/>
+                  <a:pt x="1786890" y="274320"/>
+                  <a:pt x="1783080" y="297180"/>
+                </a:cubicBezTo>
+                <a:cubicBezTo>
+                  <a:pt x="1779270" y="320040"/>
+                  <a:pt x="1294130" y="328930"/>
+                  <a:pt x="1303020" y="350520"/>
+                </a:cubicBezTo>
+                <a:cubicBezTo>
+                  <a:pt x="1311910" y="372110"/>
+                  <a:pt x="1855470" y="403860"/>
+                  <a:pt x="1836420" y="426720"/>
+                </a:cubicBezTo>
+                <a:cubicBezTo>
+                  <a:pt x="1817370" y="449580"/>
+                  <a:pt x="1177290" y="466090"/>
+                  <a:pt x="1188720" y="487680"/>
+                </a:cubicBezTo>
+                <a:cubicBezTo>
+                  <a:pt x="1200150" y="509270"/>
+                  <a:pt x="1913890" y="535940"/>
+                  <a:pt x="1905000" y="556260"/>
+                </a:cubicBezTo>
+                <a:cubicBezTo>
+                  <a:pt x="1896110" y="576580"/>
+                  <a:pt x="1126490" y="585470"/>
+                  <a:pt x="1135380" y="609600"/>
+                </a:cubicBezTo>
+                <a:cubicBezTo>
+                  <a:pt x="1144270" y="633730"/>
+                  <a:pt x="1972310" y="676910"/>
+                  <a:pt x="1958340" y="701040"/>
+                </a:cubicBezTo>
+                <a:cubicBezTo>
+                  <a:pt x="1944370" y="725170"/>
+                  <a:pt x="1033780" y="728980"/>
+                  <a:pt x="1051560" y="754380"/>
+                </a:cubicBezTo>
+                <a:cubicBezTo>
+                  <a:pt x="1069340" y="779780"/>
+                  <a:pt x="2077720" y="824230"/>
+                  <a:pt x="2065020" y="853440"/>
+                </a:cubicBezTo>
+                <a:cubicBezTo>
+                  <a:pt x="2052320" y="882650"/>
+                  <a:pt x="969010" y="904240"/>
+                  <a:pt x="975360" y="929640"/>
+                </a:cubicBezTo>
+                <a:cubicBezTo>
+                  <a:pt x="981710" y="955040"/>
+                  <a:pt x="2110740" y="975360"/>
+                  <a:pt x="2103120" y="1005840"/>
+                </a:cubicBezTo>
+                <a:cubicBezTo>
+                  <a:pt x="2095500" y="1036320"/>
+                  <a:pt x="922020" y="1084580"/>
+                  <a:pt x="929640" y="1112520"/>
+                </a:cubicBezTo>
+                <a:cubicBezTo>
+                  <a:pt x="937260" y="1140460"/>
+                  <a:pt x="2161540" y="1145540"/>
+                  <a:pt x="2148840" y="1173480"/>
+                </a:cubicBezTo>
+                <a:cubicBezTo>
+                  <a:pt x="2136140" y="1201420"/>
+                  <a:pt x="836930" y="1249680"/>
+                  <a:pt x="853440" y="1280160"/>
+                </a:cubicBezTo>
+                <a:cubicBezTo>
+                  <a:pt x="869950" y="1310640"/>
+                  <a:pt x="2259330" y="1330960"/>
+                  <a:pt x="2247900" y="1356360"/>
+                </a:cubicBezTo>
+                <a:cubicBezTo>
+                  <a:pt x="2236470" y="1381760"/>
+                  <a:pt x="775970" y="1400810"/>
+                  <a:pt x="784860" y="1432560"/>
+                </a:cubicBezTo>
+                <a:cubicBezTo>
+                  <a:pt x="793750" y="1464310"/>
+                  <a:pt x="2313940" y="1513840"/>
+                  <a:pt x="2301240" y="1546860"/>
+                </a:cubicBezTo>
+                <a:cubicBezTo>
+                  <a:pt x="2288540" y="1579880"/>
+                  <a:pt x="695960" y="1600200"/>
+                  <a:pt x="708660" y="1630680"/>
+                </a:cubicBezTo>
+                <a:cubicBezTo>
+                  <a:pt x="721360" y="1661160"/>
+                  <a:pt x="2391410" y="1694180"/>
+                  <a:pt x="2377440" y="1729740"/>
+                </a:cubicBezTo>
+                <a:cubicBezTo>
+                  <a:pt x="2363470" y="1765300"/>
+                  <a:pt x="607060" y="1803400"/>
+                  <a:pt x="624840" y="1844040"/>
+                </a:cubicBezTo>
+                <a:cubicBezTo>
+                  <a:pt x="642620" y="1884680"/>
+                  <a:pt x="2498090" y="1931670"/>
+                  <a:pt x="2484120" y="1973580"/>
+                </a:cubicBezTo>
+                <a:cubicBezTo>
+                  <a:pt x="2470150" y="2015490"/>
+                  <a:pt x="528320" y="2057400"/>
+                  <a:pt x="541020" y="2095500"/>
+                </a:cubicBezTo>
+                <a:cubicBezTo>
+                  <a:pt x="553720" y="2133600"/>
+                  <a:pt x="2571750" y="2170430"/>
+                  <a:pt x="2560320" y="2202180"/>
+                </a:cubicBezTo>
+                <a:cubicBezTo>
+                  <a:pt x="2548890" y="2233930"/>
+                  <a:pt x="454660" y="2249170"/>
+                  <a:pt x="472440" y="2286000"/>
+                </a:cubicBezTo>
+                <a:cubicBezTo>
+                  <a:pt x="490220" y="2322830"/>
+                  <a:pt x="2682240" y="2392680"/>
+                  <a:pt x="2667000" y="2423160"/>
+                </a:cubicBezTo>
+                <a:cubicBezTo>
+                  <a:pt x="2651760" y="2453640"/>
+                  <a:pt x="365760" y="2426970"/>
+                  <a:pt x="381000" y="2468880"/>
+                </a:cubicBezTo>
+                <a:cubicBezTo>
+                  <a:pt x="396240" y="2510790"/>
+                  <a:pt x="2773680" y="2628900"/>
+                  <a:pt x="2758440" y="2674620"/>
+                </a:cubicBezTo>
+                <a:cubicBezTo>
+                  <a:pt x="2743200" y="2720340"/>
+                  <a:pt x="275590" y="2712720"/>
+                  <a:pt x="289560" y="2743200"/>
+                </a:cubicBezTo>
+                <a:cubicBezTo>
+                  <a:pt x="303530" y="2773680"/>
+                  <a:pt x="2856230" y="2820670"/>
+                  <a:pt x="2842260" y="2857500"/>
+                </a:cubicBezTo>
+                <a:cubicBezTo>
+                  <a:pt x="2828290" y="2894330"/>
+                  <a:pt x="195580" y="2933700"/>
+                  <a:pt x="205740" y="2964180"/>
+                </a:cubicBezTo>
+                <a:cubicBezTo>
+                  <a:pt x="215900" y="2994660"/>
+                  <a:pt x="2915920" y="3007360"/>
+                  <a:pt x="2903220" y="3040380"/>
+                </a:cubicBezTo>
+                <a:cubicBezTo>
+                  <a:pt x="2890520" y="3073400"/>
+                  <a:pt x="120650" y="3134360"/>
+                  <a:pt x="129540" y="3162300"/>
+                </a:cubicBezTo>
+                <a:cubicBezTo>
+                  <a:pt x="138430" y="3190240"/>
+                  <a:pt x="2969260" y="3178810"/>
+                  <a:pt x="2956560" y="3208020"/>
+                </a:cubicBezTo>
+                <a:cubicBezTo>
+                  <a:pt x="2943860" y="3237230"/>
+                  <a:pt x="39370" y="3307080"/>
+                  <a:pt x="53340" y="3337560"/>
+                </a:cubicBezTo>
+                <a:cubicBezTo>
+                  <a:pt x="67310" y="3368040"/>
+                  <a:pt x="3049270" y="3365500"/>
+                  <a:pt x="3040380" y="3390900"/>
+                </a:cubicBezTo>
+                <a:cubicBezTo>
+                  <a:pt x="3031490" y="3416300"/>
+                  <a:pt x="1515745" y="3453130"/>
+                  <a:pt x="0" y="3489960"/>
+                </a:cubicBezTo>
+              </a:path>
+            </a:pathLst>
+          </a:custGeom>
+          <a:noFill/>
+        </p:spPr>
+        <p:style>
+          <a:lnRef idx="2">
+            <a:schemeClr val="accent1">
+              <a:shade val="50000"/>
+            </a:schemeClr>
+          </a:lnRef>
+          <a:fillRef idx="1">
+            <a:schemeClr val="accent1"/>
+          </a:fillRef>
+          <a:effectRef idx="0">
+            <a:schemeClr val="accent1"/>
+          </a:effectRef>
+          <a:fontRef idx="minor">
+            <a:schemeClr val="lt1"/>
+          </a:fontRef>
+        </p:style>
+        <p:txBody>
+          <a:bodyPr rtlCol="0" anchor="ctr"/>
+          <a:lstStyle/>
+          <a:p>
+            <a:pPr algn="ctr"/>
+            <a:endParaRPr lang="en-IN"/>
+          </a:p>
+        </p:txBody>
+      </p:sp>
+      <p:cxnSp>
+        <p:nvCxnSpPr>
+          <p:cNvPr id="23" name="Straight Arrow Connector 22">
+            <a:extLst>
+              <a:ext uri="{FF2B5EF4-FFF2-40B4-BE49-F238E27FC236}">
+                <a16:creationId xmlns:a16="http://schemas.microsoft.com/office/drawing/2014/main" id="{56ADF744-C7C3-450E-A327-6D0B957A3DF1}"/>
+              </a:ext>
+            </a:extLst>
+          </p:cNvPr>
+          <p:cNvCxnSpPr/>
+          <p:nvPr/>
+        </p:nvCxnSpPr>
+        <p:spPr>
+          <a:xfrm flipV="1">
+            <a:off x="3027680" y="853440"/>
+            <a:ext cx="0" cy="5201920"/>
+          </a:xfrm>
+          <a:prstGeom prst="straightConnector1">
+            <a:avLst/>
+          </a:prstGeom>
+          <a:ln w="57150">
+            <a:tailEnd type="triangle"/>
+          </a:ln>
+        </p:spPr>
+        <p:style>
+          <a:lnRef idx="1">
+            <a:schemeClr val="dk1"/>
+          </a:lnRef>
+          <a:fillRef idx="0">
+            <a:schemeClr val="dk1"/>
+          </a:fillRef>
+          <a:effectRef idx="0">
+            <a:schemeClr val="dk1"/>
+          </a:effectRef>
+          <a:fontRef idx="minor">
+            <a:schemeClr val="tx1"/>
+          </a:fontRef>
+        </p:style>
+      </p:cxnSp>
+      <p:cxnSp>
+        <p:nvCxnSpPr>
+          <p:cNvPr id="24" name="Straight Arrow Connector 23">
+            <a:extLst>
+              <a:ext uri="{FF2B5EF4-FFF2-40B4-BE49-F238E27FC236}">
+                <a16:creationId xmlns:a16="http://schemas.microsoft.com/office/drawing/2014/main" id="{87B5EB92-0826-4F06-9AAA-C55E5A8D1C48}"/>
+              </a:ext>
+            </a:extLst>
+          </p:cNvPr>
+          <p:cNvCxnSpPr>
+            <a:cxnSpLocks/>
+          </p:cNvCxnSpPr>
+          <p:nvPr/>
+        </p:nvCxnSpPr>
+        <p:spPr>
+          <a:xfrm>
+            <a:off x="3007360" y="6024880"/>
+            <a:ext cx="5730240" cy="0"/>
+          </a:xfrm>
+          <a:prstGeom prst="straightConnector1">
+            <a:avLst/>
+          </a:prstGeom>
+          <a:ln w="57150">
+            <a:tailEnd type="triangle"/>
+          </a:ln>
+        </p:spPr>
+        <p:style>
+          <a:lnRef idx="1">
+            <a:schemeClr val="dk1"/>
+          </a:lnRef>
+          <a:fillRef idx="0">
+            <a:schemeClr val="dk1"/>
+          </a:fillRef>
+          <a:effectRef idx="0">
+            <a:schemeClr val="dk1"/>
+          </a:effectRef>
+          <a:fontRef idx="minor">
+            <a:schemeClr val="tx1"/>
+          </a:fontRef>
+        </p:style>
+      </p:cxnSp>
+      <p:sp>
+        <p:nvSpPr>
+          <p:cNvPr id="49" name="TextBox 48">
+            <a:extLst>
+              <a:ext uri="{FF2B5EF4-FFF2-40B4-BE49-F238E27FC236}">
+                <a16:creationId xmlns:a16="http://schemas.microsoft.com/office/drawing/2014/main" id="{5D6342BA-3403-44C3-97EB-CBE8A166D4A7}"/>
+              </a:ext>
+            </a:extLst>
+          </p:cNvPr>
+          <p:cNvSpPr txBox="1"/>
+          <p:nvPr/>
+        </p:nvSpPr>
+        <p:spPr>
+          <a:xfrm>
+            <a:off x="2890520" y="453629"/>
+            <a:ext cx="274320" cy="369332"/>
+          </a:xfrm>
+          <a:prstGeom prst="rect">
+            <a:avLst/>
+          </a:prstGeom>
+          <a:noFill/>
+        </p:spPr>
+        <p:txBody>
+          <a:bodyPr wrap="square" rtlCol="0">
+            <a:spAutoFit/>
+          </a:bodyPr>
+          <a:lstStyle/>
+          <a:p>
+            <a:r>
+              <a:rPr lang="en-US" b="1"/>
+              <a:t>T</a:t>
+            </a:r>
+            <a:endParaRPr lang="en-IN" b="1"/>
+          </a:p>
+        </p:txBody>
+      </p:sp>
+      <p:sp>
+        <p:nvSpPr>
+          <p:cNvPr id="50" name="TextBox 49">
+            <a:extLst>
+              <a:ext uri="{FF2B5EF4-FFF2-40B4-BE49-F238E27FC236}">
+                <a16:creationId xmlns:a16="http://schemas.microsoft.com/office/drawing/2014/main" id="{33FAA83A-95EA-48FE-BF0C-9A75C036829C}"/>
+              </a:ext>
+            </a:extLst>
+          </p:cNvPr>
+          <p:cNvSpPr txBox="1"/>
+          <p:nvPr/>
+        </p:nvSpPr>
+        <p:spPr>
+          <a:xfrm>
+            <a:off x="8692188" y="5815363"/>
+            <a:ext cx="274320" cy="369332"/>
+          </a:xfrm>
+          <a:prstGeom prst="rect">
+            <a:avLst/>
+          </a:prstGeom>
+          <a:noFill/>
+        </p:spPr>
+        <p:txBody>
+          <a:bodyPr wrap="square" rtlCol="0">
+            <a:spAutoFit/>
+          </a:bodyPr>
+          <a:lstStyle/>
+          <a:p>
+            <a:r>
+              <a:rPr lang="en-US" b="1"/>
+              <a:t>S</a:t>
+            </a:r>
+            <a:endParaRPr lang="en-IN" b="1"/>
+          </a:p>
+        </p:txBody>
+      </p:sp>
+      <p:sp>
+        <p:nvSpPr>
+          <p:cNvPr id="2" name="Freeform: Shape 1">
+            <a:extLst>
+              <a:ext uri="{FF2B5EF4-FFF2-40B4-BE49-F238E27FC236}">
+                <a16:creationId xmlns:a16="http://schemas.microsoft.com/office/drawing/2014/main" id="{B4C4D543-18BC-4DF8-84A8-F8C45D3C1929}"/>
+              </a:ext>
+            </a:extLst>
+          </p:cNvPr>
+          <p:cNvSpPr/>
+          <p:nvPr/>
+        </p:nvSpPr>
+        <p:spPr>
+          <a:xfrm>
+            <a:off x="3951405" y="1885053"/>
+            <a:ext cx="3211395" cy="3554351"/>
+          </a:xfrm>
+          <a:custGeom>
+            <a:avLst/>
+            <a:gdLst>
+              <a:gd name="connsiteX0" fmla="*/ 10995 w 3211395"/>
+              <a:gd name="connsiteY0" fmla="*/ 3502735 h 3554351"/>
+              <a:gd name="connsiteX1" fmla="*/ 91677 w 3211395"/>
+              <a:gd name="connsiteY1" fmla="*/ 3341371 h 3554351"/>
+              <a:gd name="connsiteX2" fmla="*/ 683348 w 3211395"/>
+              <a:gd name="connsiteY2" fmla="*/ 1799441 h 3554351"/>
+              <a:gd name="connsiteX3" fmla="*/ 1373630 w 3211395"/>
+              <a:gd name="connsiteY3" fmla="*/ 248547 h 3554351"/>
+              <a:gd name="connsiteX4" fmla="*/ 1741183 w 3211395"/>
+              <a:gd name="connsiteY4" fmla="*/ 42359 h 3554351"/>
+              <a:gd name="connsiteX5" fmla="*/ 2081842 w 3211395"/>
+              <a:gd name="connsiteY5" fmla="*/ 660923 h 3554351"/>
+              <a:gd name="connsiteX6" fmla="*/ 2664548 w 3211395"/>
+              <a:gd name="connsiteY6" fmla="*/ 2104241 h 3554351"/>
+              <a:gd name="connsiteX7" fmla="*/ 3211395 w 3211395"/>
+              <a:gd name="connsiteY7" fmla="*/ 3529629 h 3554351"/>
+            </a:gdLst>
+            <a:ahLst/>
+            <a:cxnLst>
+              <a:cxn ang="0">
+                <a:pos x="connsiteX0" y="connsiteY0"/>
+              </a:cxn>
+              <a:cxn ang="0">
+                <a:pos x="connsiteX1" y="connsiteY1"/>
+              </a:cxn>
+              <a:cxn ang="0">
+                <a:pos x="connsiteX2" y="connsiteY2"/>
+              </a:cxn>
+              <a:cxn ang="0">
+                <a:pos x="connsiteX3" y="connsiteY3"/>
+              </a:cxn>
+              <a:cxn ang="0">
+                <a:pos x="connsiteX4" y="connsiteY4"/>
+              </a:cxn>
+              <a:cxn ang="0">
+                <a:pos x="connsiteX5" y="connsiteY5"/>
+              </a:cxn>
+              <a:cxn ang="0">
+                <a:pos x="connsiteX6" y="connsiteY6"/>
+              </a:cxn>
+              <a:cxn ang="0">
+                <a:pos x="connsiteX7" y="connsiteY7"/>
+              </a:cxn>
+            </a:cxnLst>
+            <a:rect l="l" t="t" r="r" b="b"/>
+            <a:pathLst>
+              <a:path w="3211395" h="3554351">
+                <a:moveTo>
+                  <a:pt x="10995" y="3502735"/>
+                </a:moveTo>
+                <a:cubicBezTo>
+                  <a:pt x="-4694" y="3563994"/>
+                  <a:pt x="-20382" y="3625253"/>
+                  <a:pt x="91677" y="3341371"/>
+                </a:cubicBezTo>
+                <a:cubicBezTo>
+                  <a:pt x="203736" y="3057489"/>
+                  <a:pt x="469689" y="2314912"/>
+                  <a:pt x="683348" y="1799441"/>
+                </a:cubicBezTo>
+                <a:cubicBezTo>
+                  <a:pt x="897007" y="1283970"/>
+                  <a:pt x="1197324" y="541394"/>
+                  <a:pt x="1373630" y="248547"/>
+                </a:cubicBezTo>
+                <a:cubicBezTo>
+                  <a:pt x="1549936" y="-44300"/>
+                  <a:pt x="1623148" y="-26370"/>
+                  <a:pt x="1741183" y="42359"/>
+                </a:cubicBezTo>
+                <a:cubicBezTo>
+                  <a:pt x="1859218" y="111088"/>
+                  <a:pt x="1927948" y="317276"/>
+                  <a:pt x="2081842" y="660923"/>
+                </a:cubicBezTo>
+                <a:cubicBezTo>
+                  <a:pt x="2235736" y="1004570"/>
+                  <a:pt x="2476289" y="1626123"/>
+                  <a:pt x="2664548" y="2104241"/>
+                </a:cubicBezTo>
+                <a:cubicBezTo>
+                  <a:pt x="2852807" y="2582359"/>
+                  <a:pt x="3032101" y="3055994"/>
+                  <a:pt x="3211395" y="3529629"/>
+                </a:cubicBezTo>
+              </a:path>
+            </a:pathLst>
+          </a:custGeom>
+          <a:ln w="57150"/>
+        </p:spPr>
+        <p:style>
+          <a:lnRef idx="1">
+            <a:schemeClr val="dk1"/>
+          </a:lnRef>
+          <a:fillRef idx="0">
+            <a:schemeClr val="dk1"/>
+          </a:fillRef>
+          <a:effectRef idx="0">
+            <a:schemeClr val="dk1"/>
+          </a:effectRef>
+          <a:fontRef idx="minor">
+            <a:schemeClr val="tx1"/>
+          </a:fontRef>
+        </p:style>
+        <p:txBody>
+          <a:bodyPr rtlCol="0" anchor="ctr"/>
+          <a:lstStyle/>
+          <a:p>
+            <a:pPr algn="ctr"/>
+            <a:endParaRPr lang="en-IN"/>
+          </a:p>
+        </p:txBody>
+      </p:sp>
+      <p:cxnSp>
+        <p:nvCxnSpPr>
+          <p:cNvPr id="4" name="Straight Connector 3">
+            <a:extLst>
+              <a:ext uri="{FF2B5EF4-FFF2-40B4-BE49-F238E27FC236}">
+                <a16:creationId xmlns:a16="http://schemas.microsoft.com/office/drawing/2014/main" id="{230ED110-5F48-4E7D-808D-42435AF53339}"/>
+              </a:ext>
+            </a:extLst>
+          </p:cNvPr>
+          <p:cNvCxnSpPr>
+            <a:cxnSpLocks/>
+          </p:cNvCxnSpPr>
+          <p:nvPr/>
+        </p:nvCxnSpPr>
+        <p:spPr>
+          <a:xfrm flipH="1">
+            <a:off x="3007360" y="5425888"/>
+            <a:ext cx="955040" cy="0"/>
+          </a:xfrm>
+          <a:prstGeom prst="line">
+            <a:avLst/>
+          </a:prstGeom>
+          <a:ln w="57150"/>
+        </p:spPr>
+        <p:style>
+          <a:lnRef idx="1">
+            <a:schemeClr val="dk1"/>
+          </a:lnRef>
+          <a:fillRef idx="0">
+            <a:schemeClr val="dk1"/>
+          </a:fillRef>
+          <a:effectRef idx="0">
+            <a:schemeClr val="dk1"/>
+          </a:effectRef>
+          <a:fontRef idx="minor">
+            <a:schemeClr val="tx1"/>
+          </a:fontRef>
+        </p:style>
+      </p:cxnSp>
+      <p:cxnSp>
+        <p:nvCxnSpPr>
+          <p:cNvPr id="10" name="Straight Connector 9">
+            <a:extLst>
+              <a:ext uri="{FF2B5EF4-FFF2-40B4-BE49-F238E27FC236}">
+                <a16:creationId xmlns:a16="http://schemas.microsoft.com/office/drawing/2014/main" id="{7B8E5E8A-6EA0-4B9C-BF39-7FE99611EDED}"/>
+              </a:ext>
+            </a:extLst>
+          </p:cNvPr>
+          <p:cNvCxnSpPr>
+            <a:cxnSpLocks/>
+          </p:cNvCxnSpPr>
+          <p:nvPr/>
+        </p:nvCxnSpPr>
+        <p:spPr>
+          <a:xfrm flipV="1">
+            <a:off x="3596640" y="4564380"/>
+            <a:ext cx="678180" cy="875024"/>
+          </a:xfrm>
+          <a:prstGeom prst="line">
+            <a:avLst/>
+          </a:prstGeom>
+          <a:ln w="57150">
+            <a:solidFill>
+              <a:schemeClr val="accent2">
+                <a:lumMod val="75000"/>
+              </a:schemeClr>
+            </a:solidFill>
+          </a:ln>
+        </p:spPr>
+        <p:style>
+          <a:lnRef idx="1">
+            <a:schemeClr val="dk1"/>
+          </a:lnRef>
+          <a:fillRef idx="0">
+            <a:schemeClr val="dk1"/>
+          </a:fillRef>
+          <a:effectRef idx="0">
+            <a:schemeClr val="dk1"/>
+          </a:effectRef>
+          <a:fontRef idx="minor">
+            <a:schemeClr val="tx1"/>
+          </a:fontRef>
+        </p:style>
+      </p:cxnSp>
+      <p:cxnSp>
+        <p:nvCxnSpPr>
+          <p:cNvPr id="59" name="Straight Connector 58">
+            <a:extLst>
+              <a:ext uri="{FF2B5EF4-FFF2-40B4-BE49-F238E27FC236}">
+                <a16:creationId xmlns:a16="http://schemas.microsoft.com/office/drawing/2014/main" id="{EB71CE79-F824-43C5-BEED-4E01AD7B2721}"/>
+              </a:ext>
+            </a:extLst>
+          </p:cNvPr>
+          <p:cNvCxnSpPr>
+            <a:cxnSpLocks/>
+          </p:cNvCxnSpPr>
+          <p:nvPr/>
+        </p:nvCxnSpPr>
+        <p:spPr>
+          <a:xfrm>
+            <a:off x="4274820" y="4564380"/>
+            <a:ext cx="2583180" cy="0"/>
+          </a:xfrm>
+          <a:prstGeom prst="line">
+            <a:avLst/>
+          </a:prstGeom>
+          <a:ln w="57150">
+            <a:solidFill>
+              <a:schemeClr val="accent2">
+                <a:lumMod val="75000"/>
+              </a:schemeClr>
+            </a:solidFill>
+          </a:ln>
+        </p:spPr>
+        <p:style>
+          <a:lnRef idx="1">
+            <a:schemeClr val="dk1"/>
+          </a:lnRef>
+          <a:fillRef idx="0">
+            <a:schemeClr val="dk1"/>
+          </a:fillRef>
+          <a:effectRef idx="0">
+            <a:schemeClr val="dk1"/>
+          </a:effectRef>
+          <a:fontRef idx="minor">
+            <a:schemeClr val="tx1"/>
+          </a:fontRef>
+        </p:style>
+      </p:cxnSp>
+      <p:sp>
+        <p:nvSpPr>
+          <p:cNvPr id="16" name="Freeform: Shape 15">
+            <a:extLst>
+              <a:ext uri="{FF2B5EF4-FFF2-40B4-BE49-F238E27FC236}">
+                <a16:creationId xmlns:a16="http://schemas.microsoft.com/office/drawing/2014/main" id="{D8ADDDDB-582D-437A-834B-B1CC0CD8409D}"/>
+              </a:ext>
+            </a:extLst>
+          </p:cNvPr>
+          <p:cNvSpPr/>
+          <p:nvPr/>
+        </p:nvSpPr>
+        <p:spPr>
+          <a:xfrm>
+            <a:off x="6835140" y="3985260"/>
+            <a:ext cx="777240" cy="571500"/>
+          </a:xfrm>
+          <a:custGeom>
+            <a:avLst/>
+            <a:gdLst>
+              <a:gd name="connsiteX0" fmla="*/ 0 w 777240"/>
+              <a:gd name="connsiteY0" fmla="*/ 571500 h 571500"/>
+              <a:gd name="connsiteX1" fmla="*/ 457200 w 777240"/>
+              <a:gd name="connsiteY1" fmla="*/ 403860 h 571500"/>
+              <a:gd name="connsiteX2" fmla="*/ 777240 w 777240"/>
+              <a:gd name="connsiteY2" fmla="*/ 0 h 571500"/>
+            </a:gdLst>
+            <a:ahLst/>
+            <a:cxnLst>
+              <a:cxn ang="0">
+                <a:pos x="connsiteX0" y="connsiteY0"/>
+              </a:cxn>
+              <a:cxn ang="0">
+                <a:pos x="connsiteX1" y="connsiteY1"/>
+              </a:cxn>
+              <a:cxn ang="0">
+                <a:pos x="connsiteX2" y="connsiteY2"/>
+              </a:cxn>
+            </a:cxnLst>
+            <a:rect l="l" t="t" r="r" b="b"/>
+            <a:pathLst>
+              <a:path w="777240" h="571500">
+                <a:moveTo>
+                  <a:pt x="0" y="571500"/>
+                </a:moveTo>
+                <a:cubicBezTo>
+                  <a:pt x="163830" y="535305"/>
+                  <a:pt x="327660" y="499110"/>
+                  <a:pt x="457200" y="403860"/>
+                </a:cubicBezTo>
+                <a:cubicBezTo>
+                  <a:pt x="586740" y="308610"/>
+                  <a:pt x="695960" y="142240"/>
+                  <a:pt x="777240" y="0"/>
+                </a:cubicBezTo>
+              </a:path>
+            </a:pathLst>
+          </a:custGeom>
+          <a:ln w="57150">
+            <a:solidFill>
+              <a:schemeClr val="accent2">
+                <a:lumMod val="75000"/>
+              </a:schemeClr>
+            </a:solidFill>
+          </a:ln>
+        </p:spPr>
+        <p:style>
+          <a:lnRef idx="1">
+            <a:schemeClr val="dk1"/>
+          </a:lnRef>
+          <a:fillRef idx="0">
+            <a:schemeClr val="dk1"/>
+          </a:fillRef>
+          <a:effectRef idx="0">
+            <a:schemeClr val="dk1"/>
+          </a:effectRef>
+          <a:fontRef idx="minor">
+            <a:schemeClr val="tx1"/>
+          </a:fontRef>
+        </p:style>
+        <p:txBody>
+          <a:bodyPr rtlCol="0" anchor="ctr"/>
+          <a:lstStyle/>
+          <a:p>
+            <a:pPr algn="ctr"/>
+            <a:endParaRPr lang="en-IN"/>
+          </a:p>
+        </p:txBody>
+      </p:sp>
+      <p:cxnSp>
+        <p:nvCxnSpPr>
+          <p:cNvPr id="61" name="Straight Connector 60">
+            <a:extLst>
+              <a:ext uri="{FF2B5EF4-FFF2-40B4-BE49-F238E27FC236}">
+                <a16:creationId xmlns:a16="http://schemas.microsoft.com/office/drawing/2014/main" id="{BDC33599-EE5B-4D9F-8C42-7C3933807752}"/>
+              </a:ext>
+            </a:extLst>
+          </p:cNvPr>
+          <p:cNvCxnSpPr>
+            <a:cxnSpLocks/>
+            <a:endCxn id="2" idx="2"/>
+          </p:cNvCxnSpPr>
+          <p:nvPr/>
+        </p:nvCxnSpPr>
+        <p:spPr>
+          <a:xfrm flipV="1">
+            <a:off x="3302001" y="3684494"/>
+            <a:ext cx="1332752" cy="1747290"/>
+          </a:xfrm>
+          <a:prstGeom prst="line">
+            <a:avLst/>
+          </a:prstGeom>
+          <a:ln w="57150"/>
+        </p:spPr>
+        <p:style>
+          <a:lnRef idx="1">
+            <a:schemeClr val="accent6"/>
+          </a:lnRef>
+          <a:fillRef idx="0">
+            <a:schemeClr val="accent6"/>
+          </a:fillRef>
+          <a:effectRef idx="0">
+            <a:schemeClr val="accent6"/>
+          </a:effectRef>
+          <a:fontRef idx="minor">
+            <a:schemeClr val="tx1"/>
+          </a:fontRef>
+        </p:style>
+      </p:cxnSp>
+      <p:cxnSp>
+        <p:nvCxnSpPr>
+          <p:cNvPr id="62" name="Straight Connector 61">
+            <a:extLst>
+              <a:ext uri="{FF2B5EF4-FFF2-40B4-BE49-F238E27FC236}">
+                <a16:creationId xmlns:a16="http://schemas.microsoft.com/office/drawing/2014/main" id="{63B4B0DF-4FE2-41F6-A2D8-2C03FCE5B930}"/>
+              </a:ext>
+            </a:extLst>
+          </p:cNvPr>
+          <p:cNvCxnSpPr>
+            <a:cxnSpLocks/>
+          </p:cNvCxnSpPr>
+          <p:nvPr/>
+        </p:nvCxnSpPr>
+        <p:spPr>
+          <a:xfrm>
+            <a:off x="4602480" y="3699734"/>
+            <a:ext cx="1912620" cy="0"/>
+          </a:xfrm>
+          <a:prstGeom prst="line">
+            <a:avLst/>
+          </a:prstGeom>
+          <a:ln w="57150"/>
+        </p:spPr>
+        <p:style>
+          <a:lnRef idx="1">
+            <a:schemeClr val="accent6"/>
+          </a:lnRef>
+          <a:fillRef idx="0">
+            <a:schemeClr val="accent6"/>
+          </a:fillRef>
+          <a:effectRef idx="0">
+            <a:schemeClr val="accent6"/>
+          </a:effectRef>
+          <a:fontRef idx="minor">
+            <a:schemeClr val="tx1"/>
+          </a:fontRef>
+        </p:style>
+      </p:cxnSp>
+      <p:sp>
+        <p:nvSpPr>
+          <p:cNvPr id="63" name="Freeform: Shape 62">
+            <a:extLst>
+              <a:ext uri="{FF2B5EF4-FFF2-40B4-BE49-F238E27FC236}">
+                <a16:creationId xmlns:a16="http://schemas.microsoft.com/office/drawing/2014/main" id="{64B3FECE-1A06-4BFA-B2B6-E55A6676960B}"/>
+              </a:ext>
+            </a:extLst>
+          </p:cNvPr>
+          <p:cNvSpPr/>
+          <p:nvPr/>
+        </p:nvSpPr>
+        <p:spPr>
+          <a:xfrm>
+            <a:off x="6515100" y="3143250"/>
+            <a:ext cx="777240" cy="571500"/>
+          </a:xfrm>
+          <a:custGeom>
+            <a:avLst/>
+            <a:gdLst>
+              <a:gd name="connsiteX0" fmla="*/ 0 w 777240"/>
+              <a:gd name="connsiteY0" fmla="*/ 571500 h 571500"/>
+              <a:gd name="connsiteX1" fmla="*/ 457200 w 777240"/>
+              <a:gd name="connsiteY1" fmla="*/ 403860 h 571500"/>
+              <a:gd name="connsiteX2" fmla="*/ 777240 w 777240"/>
+              <a:gd name="connsiteY2" fmla="*/ 0 h 571500"/>
+            </a:gdLst>
+            <a:ahLst/>
+            <a:cxnLst>
+              <a:cxn ang="0">
+                <a:pos x="connsiteX0" y="connsiteY0"/>
+              </a:cxn>
+              <a:cxn ang="0">
+                <a:pos x="connsiteX1" y="connsiteY1"/>
+              </a:cxn>
+              <a:cxn ang="0">
+                <a:pos x="connsiteX2" y="connsiteY2"/>
+              </a:cxn>
+            </a:cxnLst>
+            <a:rect l="l" t="t" r="r" b="b"/>
+            <a:pathLst>
+              <a:path w="777240" h="571500">
+                <a:moveTo>
+                  <a:pt x="0" y="571500"/>
+                </a:moveTo>
+                <a:cubicBezTo>
+                  <a:pt x="163830" y="535305"/>
+                  <a:pt x="327660" y="499110"/>
+                  <a:pt x="457200" y="403860"/>
+                </a:cubicBezTo>
+                <a:cubicBezTo>
+                  <a:pt x="586740" y="308610"/>
+                  <a:pt x="695960" y="142240"/>
+                  <a:pt x="777240" y="0"/>
+                </a:cubicBezTo>
+              </a:path>
+            </a:pathLst>
+          </a:custGeom>
+          <a:ln w="57150"/>
+        </p:spPr>
+        <p:style>
+          <a:lnRef idx="1">
+            <a:schemeClr val="accent6"/>
+          </a:lnRef>
+          <a:fillRef idx="0">
+            <a:schemeClr val="accent6"/>
+          </a:fillRef>
+          <a:effectRef idx="0">
+            <a:schemeClr val="accent6"/>
+          </a:effectRef>
+          <a:fontRef idx="minor">
+            <a:schemeClr val="tx1"/>
+          </a:fontRef>
+        </p:style>
+        <p:txBody>
+          <a:bodyPr rtlCol="0" anchor="ctr"/>
+          <a:lstStyle/>
+          <a:p>
+            <a:pPr algn="ctr"/>
+            <a:endParaRPr lang="en-IN"/>
+          </a:p>
+        </p:txBody>
+      </p:sp>
+      <p:sp>
+        <p:nvSpPr>
+          <p:cNvPr id="64" name="TextBox 63">
+            <a:extLst>
+              <a:ext uri="{FF2B5EF4-FFF2-40B4-BE49-F238E27FC236}">
+                <a16:creationId xmlns:a16="http://schemas.microsoft.com/office/drawing/2014/main" id="{3B52648D-C9E1-4987-B9AF-77090A57AEF5}"/>
+              </a:ext>
+            </a:extLst>
+          </p:cNvPr>
+          <p:cNvSpPr txBox="1"/>
+          <p:nvPr/>
+        </p:nvSpPr>
+        <p:spPr>
+          <a:xfrm>
+            <a:off x="4924224" y="4585456"/>
+            <a:ext cx="1171776" cy="369332"/>
+          </a:xfrm>
+          <a:prstGeom prst="rect">
+            <a:avLst/>
+          </a:prstGeom>
+          <a:noFill/>
+        </p:spPr>
+        <p:txBody>
+          <a:bodyPr wrap="square" rtlCol="0">
+            <a:spAutoFit/>
+          </a:bodyPr>
+          <a:lstStyle/>
+          <a:p>
+            <a:pPr algn="ctr"/>
+            <a:r>
+              <a:rPr lang="en-US"/>
+              <a:t>P = P atm</a:t>
+            </a:r>
+            <a:endParaRPr lang="en-IN"/>
+          </a:p>
+        </p:txBody>
+      </p:sp>
+      <p:sp>
+        <p:nvSpPr>
+          <p:cNvPr id="65" name="TextBox 64">
+            <a:extLst>
+              <a:ext uri="{FF2B5EF4-FFF2-40B4-BE49-F238E27FC236}">
+                <a16:creationId xmlns:a16="http://schemas.microsoft.com/office/drawing/2014/main" id="{EABCCDDB-FED5-42CB-92C6-65E433494958}"/>
+              </a:ext>
+            </a:extLst>
+          </p:cNvPr>
+          <p:cNvSpPr txBox="1"/>
+          <p:nvPr/>
+        </p:nvSpPr>
+        <p:spPr>
+          <a:xfrm>
+            <a:off x="4971214" y="3716762"/>
+            <a:ext cx="1171776" cy="369332"/>
+          </a:xfrm>
+          <a:prstGeom prst="rect">
+            <a:avLst/>
+          </a:prstGeom>
+          <a:noFill/>
+        </p:spPr>
+        <p:txBody>
+          <a:bodyPr wrap="square" rtlCol="0">
+            <a:spAutoFit/>
+          </a:bodyPr>
+          <a:lstStyle/>
+          <a:p>
+            <a:pPr algn="ctr"/>
+            <a:r>
+              <a:rPr lang="en-US"/>
+              <a:t>P = 10 bar</a:t>
+            </a:r>
+            <a:endParaRPr lang="en-IN"/>
+          </a:p>
+        </p:txBody>
+      </p:sp>
+      <p:sp>
+        <p:nvSpPr>
+          <p:cNvPr id="66" name="TextBox 65">
+            <a:extLst>
+              <a:ext uri="{FF2B5EF4-FFF2-40B4-BE49-F238E27FC236}">
+                <a16:creationId xmlns:a16="http://schemas.microsoft.com/office/drawing/2014/main" id="{5EDD8B24-6FFC-4E48-B54B-C39EAF117C98}"/>
+              </a:ext>
+            </a:extLst>
+          </p:cNvPr>
+          <p:cNvSpPr txBox="1"/>
+          <p:nvPr/>
+        </p:nvSpPr>
+        <p:spPr>
+          <a:xfrm>
+            <a:off x="4990752" y="1461886"/>
+            <a:ext cx="1298357" cy="369332"/>
+          </a:xfrm>
+          <a:prstGeom prst="rect">
+            <a:avLst/>
+          </a:prstGeom>
+          <a:noFill/>
+        </p:spPr>
+        <p:txBody>
+          <a:bodyPr wrap="square" rtlCol="0">
+            <a:spAutoFit/>
+          </a:bodyPr>
+          <a:lstStyle/>
+          <a:p>
+            <a:pPr algn="ctr"/>
+            <a:r>
+              <a:rPr lang="en-US"/>
+              <a:t>P = 225 bar</a:t>
+            </a:r>
+            <a:endParaRPr lang="en-IN"/>
+          </a:p>
+        </p:txBody>
+      </p:sp>
+      <p:cxnSp>
+        <p:nvCxnSpPr>
+          <p:cNvPr id="21" name="Straight Arrow Connector 20">
+            <a:extLst>
+              <a:ext uri="{FF2B5EF4-FFF2-40B4-BE49-F238E27FC236}">
+                <a16:creationId xmlns:a16="http://schemas.microsoft.com/office/drawing/2014/main" id="{D793E9E9-B03B-4C86-9490-27A24DBE7FA0}"/>
+              </a:ext>
+            </a:extLst>
+          </p:cNvPr>
+          <p:cNvCxnSpPr>
+            <a:cxnSpLocks/>
+          </p:cNvCxnSpPr>
+          <p:nvPr/>
+        </p:nvCxnSpPr>
+        <p:spPr>
+          <a:xfrm flipH="1">
+            <a:off x="6515100" y="5001892"/>
+            <a:ext cx="1905000" cy="0"/>
+          </a:xfrm>
+          <a:prstGeom prst="straightConnector1">
+            <a:avLst/>
+          </a:prstGeom>
+          <a:ln w="38100">
+            <a:tailEnd type="triangle"/>
+          </a:ln>
+        </p:spPr>
+        <p:style>
+          <a:lnRef idx="1">
+            <a:schemeClr val="accent1"/>
+          </a:lnRef>
+          <a:fillRef idx="0">
+            <a:schemeClr val="accent1"/>
+          </a:fillRef>
+          <a:effectRef idx="0">
+            <a:schemeClr val="accent1"/>
+          </a:effectRef>
+          <a:fontRef idx="minor">
+            <a:schemeClr val="tx1"/>
+          </a:fontRef>
+        </p:style>
+      </p:cxnSp>
+      <p:sp>
+        <p:nvSpPr>
+          <p:cNvPr id="67" name="TextBox 66">
+            <a:extLst>
+              <a:ext uri="{FF2B5EF4-FFF2-40B4-BE49-F238E27FC236}">
+                <a16:creationId xmlns:a16="http://schemas.microsoft.com/office/drawing/2014/main" id="{BF3CE701-9F26-4354-9DB1-2ED0AF8B7394}"/>
+              </a:ext>
+            </a:extLst>
+          </p:cNvPr>
+          <p:cNvSpPr txBox="1"/>
+          <p:nvPr/>
+        </p:nvSpPr>
+        <p:spPr>
+          <a:xfrm>
+            <a:off x="3037356" y="2988335"/>
+            <a:ext cx="1662963" cy="369332"/>
+          </a:xfrm>
+          <a:prstGeom prst="rect">
+            <a:avLst/>
+          </a:prstGeom>
+          <a:noFill/>
+        </p:spPr>
+        <p:txBody>
+          <a:bodyPr wrap="square" rtlCol="0">
+            <a:spAutoFit/>
+          </a:bodyPr>
+          <a:lstStyle/>
+          <a:p>
+            <a:pPr algn="ctr"/>
+            <a:r>
+              <a:rPr lang="en-US"/>
+              <a:t>Liquid Region</a:t>
+            </a:r>
+            <a:endParaRPr lang="en-IN"/>
+          </a:p>
+        </p:txBody>
+      </p:sp>
+      <p:sp>
+        <p:nvSpPr>
+          <p:cNvPr id="68" name="TextBox 67">
+            <a:extLst>
+              <a:ext uri="{FF2B5EF4-FFF2-40B4-BE49-F238E27FC236}">
+                <a16:creationId xmlns:a16="http://schemas.microsoft.com/office/drawing/2014/main" id="{A3434F2A-2819-485E-8E91-92DFF3E8D8F6}"/>
+              </a:ext>
+            </a:extLst>
+          </p:cNvPr>
+          <p:cNvSpPr txBox="1"/>
+          <p:nvPr/>
+        </p:nvSpPr>
+        <p:spPr>
+          <a:xfrm>
+            <a:off x="8364065" y="4969626"/>
+            <a:ext cx="1662963" cy="369332"/>
+          </a:xfrm>
+          <a:prstGeom prst="rect">
+            <a:avLst/>
+          </a:prstGeom>
+          <a:noFill/>
+        </p:spPr>
+        <p:txBody>
+          <a:bodyPr wrap="square" rtlCol="0">
+            <a:spAutoFit/>
+          </a:bodyPr>
+          <a:lstStyle/>
+          <a:p>
+            <a:pPr algn="ctr"/>
+            <a:r>
+              <a:rPr lang="en-US"/>
+              <a:t>Wet Region</a:t>
+            </a:r>
+            <a:endParaRPr lang="en-IN"/>
+          </a:p>
+        </p:txBody>
+      </p:sp>
+      <p:sp>
+        <p:nvSpPr>
+          <p:cNvPr id="69" name="TextBox 68">
+            <a:extLst>
+              <a:ext uri="{FF2B5EF4-FFF2-40B4-BE49-F238E27FC236}">
+                <a16:creationId xmlns:a16="http://schemas.microsoft.com/office/drawing/2014/main" id="{7CEAB931-8F90-4DEF-9F58-850322E2A571}"/>
+              </a:ext>
+            </a:extLst>
+          </p:cNvPr>
+          <p:cNvSpPr txBox="1"/>
+          <p:nvPr/>
+        </p:nvSpPr>
+        <p:spPr>
+          <a:xfrm>
+            <a:off x="7980456" y="3613759"/>
+            <a:ext cx="1662963" cy="369332"/>
+          </a:xfrm>
+          <a:prstGeom prst="rect">
+            <a:avLst/>
+          </a:prstGeom>
+          <a:noFill/>
+        </p:spPr>
+        <p:txBody>
+          <a:bodyPr wrap="square" rtlCol="0">
+            <a:spAutoFit/>
+          </a:bodyPr>
+          <a:lstStyle/>
+          <a:p>
+            <a:pPr algn="ctr"/>
+            <a:r>
+              <a:rPr lang="en-US"/>
+              <a:t>Vapor Region</a:t>
+            </a:r>
+            <a:endParaRPr lang="en-IN"/>
+          </a:p>
+        </p:txBody>
+      </p:sp>
+      <p:cxnSp>
+        <p:nvCxnSpPr>
+          <p:cNvPr id="70" name="Straight Arrow Connector 69">
+            <a:extLst>
+              <a:ext uri="{FF2B5EF4-FFF2-40B4-BE49-F238E27FC236}">
+                <a16:creationId xmlns:a16="http://schemas.microsoft.com/office/drawing/2014/main" id="{3FEAECA9-A668-49FB-9633-D4C784774BEE}"/>
+              </a:ext>
+            </a:extLst>
+          </p:cNvPr>
+          <p:cNvCxnSpPr>
+            <a:cxnSpLocks/>
+          </p:cNvCxnSpPr>
+          <p:nvPr/>
+        </p:nvCxnSpPr>
+        <p:spPr>
+          <a:xfrm flipH="1">
+            <a:off x="5557101" y="1865365"/>
+            <a:ext cx="1905000" cy="0"/>
+          </a:xfrm>
+          <a:prstGeom prst="straightConnector1">
+            <a:avLst/>
+          </a:prstGeom>
+          <a:ln w="38100">
+            <a:tailEnd type="triangle"/>
+          </a:ln>
+        </p:spPr>
+        <p:style>
+          <a:lnRef idx="1">
+            <a:schemeClr val="accent1"/>
+          </a:lnRef>
+          <a:fillRef idx="0">
+            <a:schemeClr val="accent1"/>
+          </a:fillRef>
+          <a:effectRef idx="0">
+            <a:schemeClr val="accent1"/>
+          </a:effectRef>
+          <a:fontRef idx="minor">
+            <a:schemeClr val="tx1"/>
+          </a:fontRef>
+        </p:style>
+      </p:cxnSp>
+      <p:sp>
+        <p:nvSpPr>
+          <p:cNvPr id="71" name="TextBox 70">
+            <a:extLst>
+              <a:ext uri="{FF2B5EF4-FFF2-40B4-BE49-F238E27FC236}">
+                <a16:creationId xmlns:a16="http://schemas.microsoft.com/office/drawing/2014/main" id="{7BB30C1A-118B-45EF-A103-496FF81FBC3F}"/>
+              </a:ext>
+            </a:extLst>
+          </p:cNvPr>
+          <p:cNvSpPr txBox="1"/>
+          <p:nvPr/>
+        </p:nvSpPr>
+        <p:spPr>
+          <a:xfrm>
+            <a:off x="7318362" y="1689780"/>
+            <a:ext cx="1662963" cy="369332"/>
+          </a:xfrm>
+          <a:prstGeom prst="rect">
+            <a:avLst/>
+          </a:prstGeom>
+          <a:noFill/>
+        </p:spPr>
+        <p:txBody>
+          <a:bodyPr wrap="square" rtlCol="0">
+            <a:spAutoFit/>
+          </a:bodyPr>
+          <a:lstStyle/>
+          <a:p>
+            <a:pPr algn="ctr"/>
+            <a:r>
+              <a:rPr lang="en-US"/>
+              <a:t>Critical point</a:t>
+            </a:r>
+            <a:endParaRPr lang="en-IN"/>
+          </a:p>
+        </p:txBody>
+      </p:sp>
+      <p:sp>
+        <p:nvSpPr>
+          <p:cNvPr id="72" name="TextBox 71">
+            <a:extLst>
+              <a:ext uri="{FF2B5EF4-FFF2-40B4-BE49-F238E27FC236}">
+                <a16:creationId xmlns:a16="http://schemas.microsoft.com/office/drawing/2014/main" id="{43F644F4-2D2E-40A0-83C7-95790C8BE547}"/>
+              </a:ext>
+            </a:extLst>
+          </p:cNvPr>
+          <p:cNvSpPr txBox="1"/>
+          <p:nvPr/>
+        </p:nvSpPr>
+        <p:spPr>
+          <a:xfrm>
+            <a:off x="3459480" y="5449581"/>
+            <a:ext cx="274320" cy="369332"/>
+          </a:xfrm>
+          <a:prstGeom prst="rect">
+            <a:avLst/>
+          </a:prstGeom>
+          <a:noFill/>
+        </p:spPr>
+        <p:txBody>
+          <a:bodyPr wrap="square" rtlCol="0">
+            <a:spAutoFit/>
+          </a:bodyPr>
+          <a:lstStyle/>
+          <a:p>
+            <a:r>
+              <a:rPr lang="en-US" b="1"/>
+              <a:t>1</a:t>
+            </a:r>
+            <a:endParaRPr lang="en-IN" b="1"/>
+          </a:p>
+        </p:txBody>
+      </p:sp>
+      <p:sp>
+        <p:nvSpPr>
+          <p:cNvPr id="73" name="TextBox 72">
+            <a:extLst>
+              <a:ext uri="{FF2B5EF4-FFF2-40B4-BE49-F238E27FC236}">
+                <a16:creationId xmlns:a16="http://schemas.microsoft.com/office/drawing/2014/main" id="{DCC99345-EE4B-4CB7-9283-30F1DF774BE6}"/>
+              </a:ext>
+            </a:extLst>
+          </p:cNvPr>
+          <p:cNvSpPr txBox="1"/>
+          <p:nvPr/>
+        </p:nvSpPr>
+        <p:spPr>
+          <a:xfrm>
+            <a:off x="4213860" y="4564381"/>
+            <a:ext cx="274320" cy="369332"/>
+          </a:xfrm>
+          <a:prstGeom prst="rect">
+            <a:avLst/>
+          </a:prstGeom>
+          <a:noFill/>
+        </p:spPr>
+        <p:txBody>
+          <a:bodyPr wrap="square" rtlCol="0">
+            <a:spAutoFit/>
+          </a:bodyPr>
+          <a:lstStyle/>
+          <a:p>
+            <a:r>
+              <a:rPr lang="en-US" b="1"/>
+              <a:t>2</a:t>
+            </a:r>
+            <a:endParaRPr lang="en-IN" b="1"/>
+          </a:p>
+        </p:txBody>
+      </p:sp>
+      <p:sp>
+        <p:nvSpPr>
+          <p:cNvPr id="74" name="TextBox 73">
+            <a:extLst>
+              <a:ext uri="{FF2B5EF4-FFF2-40B4-BE49-F238E27FC236}">
+                <a16:creationId xmlns:a16="http://schemas.microsoft.com/office/drawing/2014/main" id="{FCD43162-2AE7-44E5-8E25-C8334185DBD0}"/>
+              </a:ext>
+            </a:extLst>
+          </p:cNvPr>
+          <p:cNvSpPr txBox="1"/>
+          <p:nvPr/>
+        </p:nvSpPr>
+        <p:spPr>
+          <a:xfrm>
+            <a:off x="6583680" y="4572001"/>
+            <a:ext cx="274320" cy="369332"/>
+          </a:xfrm>
+          <a:prstGeom prst="rect">
+            <a:avLst/>
+          </a:prstGeom>
+          <a:noFill/>
+        </p:spPr>
+        <p:txBody>
+          <a:bodyPr wrap="square" rtlCol="0">
+            <a:spAutoFit/>
+          </a:bodyPr>
+          <a:lstStyle/>
+          <a:p>
+            <a:r>
+              <a:rPr lang="en-US" b="1"/>
+              <a:t>3</a:t>
+            </a:r>
+            <a:endParaRPr lang="en-IN" b="1"/>
+          </a:p>
+        </p:txBody>
+      </p:sp>
+      <p:sp>
+        <p:nvSpPr>
+          <p:cNvPr id="75" name="TextBox 74">
+            <a:extLst>
+              <a:ext uri="{FF2B5EF4-FFF2-40B4-BE49-F238E27FC236}">
+                <a16:creationId xmlns:a16="http://schemas.microsoft.com/office/drawing/2014/main" id="{6DC52DF2-F6DD-489B-9078-1AFDB348B9E9}"/>
+              </a:ext>
+            </a:extLst>
+          </p:cNvPr>
+          <p:cNvSpPr txBox="1"/>
+          <p:nvPr/>
+        </p:nvSpPr>
+        <p:spPr>
+          <a:xfrm>
+            <a:off x="7444740" y="3609573"/>
+            <a:ext cx="274320" cy="369332"/>
+          </a:xfrm>
+          <a:prstGeom prst="rect">
+            <a:avLst/>
+          </a:prstGeom>
+          <a:noFill/>
+        </p:spPr>
+        <p:txBody>
+          <a:bodyPr wrap="square" rtlCol="0">
+            <a:spAutoFit/>
+          </a:bodyPr>
+          <a:lstStyle/>
+          <a:p>
+            <a:r>
+              <a:rPr lang="en-US" b="1"/>
+              <a:t>4</a:t>
+            </a:r>
+            <a:endParaRPr lang="en-IN" b="1"/>
+          </a:p>
+        </p:txBody>
+      </p:sp>
+      <p:sp>
+        <p:nvSpPr>
+          <p:cNvPr id="76" name="TextBox 75">
+            <a:extLst>
+              <a:ext uri="{FF2B5EF4-FFF2-40B4-BE49-F238E27FC236}">
+                <a16:creationId xmlns:a16="http://schemas.microsoft.com/office/drawing/2014/main" id="{B1F67839-6B94-4623-925D-B3DA1D16C71D}"/>
+              </a:ext>
+            </a:extLst>
+          </p:cNvPr>
+          <p:cNvSpPr txBox="1"/>
+          <p:nvPr/>
+        </p:nvSpPr>
+        <p:spPr>
+          <a:xfrm>
+            <a:off x="7120455" y="2820213"/>
+            <a:ext cx="274320" cy="369332"/>
+          </a:xfrm>
+          <a:prstGeom prst="rect">
+            <a:avLst/>
+          </a:prstGeom>
+          <a:noFill/>
+        </p:spPr>
+        <p:txBody>
+          <a:bodyPr wrap="square" rtlCol="0">
+            <a:spAutoFit/>
+          </a:bodyPr>
+          <a:lstStyle/>
+          <a:p>
+            <a:r>
+              <a:rPr lang="en-US" b="1"/>
+              <a:t>8</a:t>
+            </a:r>
+            <a:endParaRPr lang="en-IN" b="1"/>
+          </a:p>
+        </p:txBody>
+      </p:sp>
+      <p:sp>
+        <p:nvSpPr>
+          <p:cNvPr id="77" name="TextBox 76">
+            <a:extLst>
+              <a:ext uri="{FF2B5EF4-FFF2-40B4-BE49-F238E27FC236}">
+                <a16:creationId xmlns:a16="http://schemas.microsoft.com/office/drawing/2014/main" id="{0C896AEF-0EFC-4AD1-ADAE-271427B81B32}"/>
+              </a:ext>
+            </a:extLst>
+          </p:cNvPr>
+          <p:cNvSpPr txBox="1"/>
+          <p:nvPr/>
+        </p:nvSpPr>
+        <p:spPr>
+          <a:xfrm>
+            <a:off x="6276973" y="3705106"/>
+            <a:ext cx="274320" cy="369332"/>
+          </a:xfrm>
+          <a:prstGeom prst="rect">
+            <a:avLst/>
+          </a:prstGeom>
+          <a:noFill/>
+        </p:spPr>
+        <p:txBody>
+          <a:bodyPr wrap="square" rtlCol="0">
+            <a:spAutoFit/>
+          </a:bodyPr>
+          <a:lstStyle/>
+          <a:p>
+            <a:r>
+              <a:rPr lang="en-US" b="1"/>
+              <a:t>7</a:t>
+            </a:r>
+            <a:endParaRPr lang="en-IN" b="1"/>
+          </a:p>
+        </p:txBody>
+      </p:sp>
+      <p:sp>
+        <p:nvSpPr>
+          <p:cNvPr id="78" name="TextBox 77">
+            <a:extLst>
+              <a:ext uri="{FF2B5EF4-FFF2-40B4-BE49-F238E27FC236}">
+                <a16:creationId xmlns:a16="http://schemas.microsoft.com/office/drawing/2014/main" id="{4A3453CB-D2E3-43EA-938E-583DCE34AA23}"/>
+              </a:ext>
+            </a:extLst>
+          </p:cNvPr>
+          <p:cNvSpPr txBox="1"/>
+          <p:nvPr/>
+        </p:nvSpPr>
+        <p:spPr>
+          <a:xfrm>
+            <a:off x="4536637" y="3666973"/>
+            <a:ext cx="274320" cy="369332"/>
+          </a:xfrm>
+          <a:prstGeom prst="rect">
+            <a:avLst/>
+          </a:prstGeom>
+          <a:noFill/>
+        </p:spPr>
+        <p:txBody>
+          <a:bodyPr wrap="square" rtlCol="0">
+            <a:spAutoFit/>
+          </a:bodyPr>
+          <a:lstStyle/>
+          <a:p>
+            <a:r>
+              <a:rPr lang="en-US" b="1"/>
+              <a:t>6</a:t>
+            </a:r>
+            <a:endParaRPr lang="en-IN" b="1"/>
+          </a:p>
+        </p:txBody>
+      </p:sp>
+      <p:sp>
+        <p:nvSpPr>
+          <p:cNvPr id="79" name="TextBox 78">
+            <a:extLst>
+              <a:ext uri="{FF2B5EF4-FFF2-40B4-BE49-F238E27FC236}">
+                <a16:creationId xmlns:a16="http://schemas.microsoft.com/office/drawing/2014/main" id="{7976C9B3-7EC7-4CEE-A946-1F0F51A2BC21}"/>
+              </a:ext>
+            </a:extLst>
+          </p:cNvPr>
+          <p:cNvSpPr txBox="1"/>
+          <p:nvPr/>
+        </p:nvSpPr>
+        <p:spPr>
+          <a:xfrm>
+            <a:off x="3133090" y="5446031"/>
+            <a:ext cx="274320" cy="369332"/>
+          </a:xfrm>
+          <a:prstGeom prst="rect">
+            <a:avLst/>
+          </a:prstGeom>
+          <a:noFill/>
+        </p:spPr>
+        <p:txBody>
+          <a:bodyPr wrap="square" rtlCol="0">
+            <a:spAutoFit/>
+          </a:bodyPr>
+          <a:lstStyle/>
+          <a:p>
+            <a:r>
+              <a:rPr lang="en-US" b="1"/>
+              <a:t>5</a:t>
+            </a:r>
+            <a:endParaRPr lang="en-IN" b="1"/>
+          </a:p>
+        </p:txBody>
+      </p:sp>
+      <p:cxnSp>
+        <p:nvCxnSpPr>
+          <p:cNvPr id="80" name="Straight Arrow Connector 79">
+            <a:extLst>
+              <a:ext uri="{FF2B5EF4-FFF2-40B4-BE49-F238E27FC236}">
+                <a16:creationId xmlns:a16="http://schemas.microsoft.com/office/drawing/2014/main" id="{C4FF3009-8FC3-42D8-B765-14412DC300EF}"/>
+              </a:ext>
+            </a:extLst>
+          </p:cNvPr>
+          <p:cNvCxnSpPr>
+            <a:cxnSpLocks/>
+          </p:cNvCxnSpPr>
+          <p:nvPr/>
+        </p:nvCxnSpPr>
+        <p:spPr>
+          <a:xfrm flipH="1">
+            <a:off x="6320355" y="2820213"/>
+            <a:ext cx="1905000" cy="0"/>
+          </a:xfrm>
+          <a:prstGeom prst="straightConnector1">
+            <a:avLst/>
+          </a:prstGeom>
+          <a:ln w="38100">
+            <a:tailEnd type="triangle"/>
+          </a:ln>
+        </p:spPr>
+        <p:style>
+          <a:lnRef idx="1">
+            <a:schemeClr val="accent1"/>
+          </a:lnRef>
+          <a:fillRef idx="0">
+            <a:schemeClr val="accent1"/>
+          </a:fillRef>
+          <a:effectRef idx="0">
+            <a:schemeClr val="accent1"/>
+          </a:effectRef>
+          <a:fontRef idx="minor">
+            <a:schemeClr val="tx1"/>
+          </a:fontRef>
+        </p:style>
+      </p:cxnSp>
+      <p:sp>
+        <p:nvSpPr>
+          <p:cNvPr id="81" name="TextBox 80">
+            <a:extLst>
+              <a:ext uri="{FF2B5EF4-FFF2-40B4-BE49-F238E27FC236}">
+                <a16:creationId xmlns:a16="http://schemas.microsoft.com/office/drawing/2014/main" id="{93C3AEF8-65F7-46E5-B2E6-2E32532B5E97}"/>
+              </a:ext>
+            </a:extLst>
+          </p:cNvPr>
+          <p:cNvSpPr txBox="1"/>
+          <p:nvPr/>
+        </p:nvSpPr>
+        <p:spPr>
+          <a:xfrm>
+            <a:off x="7997866" y="2573082"/>
+            <a:ext cx="1662963" cy="646331"/>
+          </a:xfrm>
+          <a:prstGeom prst="rect">
+            <a:avLst/>
+          </a:prstGeom>
+          <a:noFill/>
+        </p:spPr>
+        <p:txBody>
+          <a:bodyPr wrap="square" rtlCol="0">
+            <a:spAutoFit/>
+          </a:bodyPr>
+          <a:lstStyle/>
+          <a:p>
+            <a:pPr algn="ctr"/>
+            <a:r>
+              <a:rPr lang="en-US"/>
+              <a:t>Saturated Vapour Line</a:t>
+            </a:r>
+            <a:endParaRPr lang="en-IN"/>
+          </a:p>
+        </p:txBody>
+      </p:sp>
+      <p:sp>
+        <p:nvSpPr>
+          <p:cNvPr id="82" name="TextBox 81">
+            <a:extLst>
+              <a:ext uri="{FF2B5EF4-FFF2-40B4-BE49-F238E27FC236}">
+                <a16:creationId xmlns:a16="http://schemas.microsoft.com/office/drawing/2014/main" id="{6198313A-4EE4-4BF2-8530-59E81FD07DA4}"/>
+              </a:ext>
+            </a:extLst>
+          </p:cNvPr>
+          <p:cNvSpPr txBox="1"/>
+          <p:nvPr/>
+        </p:nvSpPr>
+        <p:spPr>
+          <a:xfrm>
+            <a:off x="3239159" y="1748908"/>
+            <a:ext cx="1662963" cy="646331"/>
+          </a:xfrm>
+          <a:prstGeom prst="rect">
+            <a:avLst/>
+          </a:prstGeom>
+          <a:noFill/>
+        </p:spPr>
+        <p:txBody>
+          <a:bodyPr wrap="square" rtlCol="0">
+            <a:spAutoFit/>
+          </a:bodyPr>
+          <a:lstStyle/>
+          <a:p>
+            <a:pPr algn="ctr"/>
+            <a:r>
+              <a:rPr lang="en-US"/>
+              <a:t>Saturated Vapour Line</a:t>
+            </a:r>
+            <a:endParaRPr lang="en-IN"/>
+          </a:p>
+        </p:txBody>
+      </p:sp>
+      <p:cxnSp>
+        <p:nvCxnSpPr>
+          <p:cNvPr id="83" name="Straight Arrow Connector 82">
+            <a:extLst>
+              <a:ext uri="{FF2B5EF4-FFF2-40B4-BE49-F238E27FC236}">
+                <a16:creationId xmlns:a16="http://schemas.microsoft.com/office/drawing/2014/main" id="{13CE9F66-75F2-4AA5-BAE1-AC23164DA62C}"/>
+              </a:ext>
+            </a:extLst>
+          </p:cNvPr>
+          <p:cNvCxnSpPr>
+            <a:cxnSpLocks/>
+          </p:cNvCxnSpPr>
+          <p:nvPr/>
+        </p:nvCxnSpPr>
+        <p:spPr>
+          <a:xfrm>
+            <a:off x="4700319" y="2072073"/>
+            <a:ext cx="505230" cy="0"/>
+          </a:xfrm>
+          <a:prstGeom prst="straightConnector1">
+            <a:avLst/>
+          </a:prstGeom>
+          <a:ln w="38100">
+            <a:tailEnd type="triangle"/>
+          </a:ln>
+        </p:spPr>
+        <p:style>
+          <a:lnRef idx="1">
+            <a:schemeClr val="accent1"/>
+          </a:lnRef>
+          <a:fillRef idx="0">
+            <a:schemeClr val="accent1"/>
+          </a:fillRef>
+          <a:effectRef idx="0">
+            <a:schemeClr val="accent1"/>
+          </a:effectRef>
+          <a:fontRef idx="minor">
+            <a:schemeClr val="tx1"/>
+          </a:fontRef>
+        </p:style>
+      </p:cxnSp>
+      <p:cxnSp>
+        <p:nvCxnSpPr>
+          <p:cNvPr id="84" name="Straight Arrow Connector 83">
+            <a:extLst>
+              <a:ext uri="{FF2B5EF4-FFF2-40B4-BE49-F238E27FC236}">
+                <a16:creationId xmlns:a16="http://schemas.microsoft.com/office/drawing/2014/main" id="{2F1D2AF5-5E22-49C8-B596-B4D9C5C52E7B}"/>
+              </a:ext>
+            </a:extLst>
+          </p:cNvPr>
+          <p:cNvCxnSpPr>
+            <a:cxnSpLocks/>
+          </p:cNvCxnSpPr>
+          <p:nvPr/>
+        </p:nvCxnSpPr>
+        <p:spPr>
+          <a:xfrm flipV="1">
+            <a:off x="2392622" y="4564381"/>
+            <a:ext cx="1810690" cy="7620"/>
+          </a:xfrm>
+          <a:prstGeom prst="straightConnector1">
+            <a:avLst/>
+          </a:prstGeom>
+          <a:ln w="38100">
+            <a:tailEnd type="triangle"/>
+          </a:ln>
+        </p:spPr>
+        <p:style>
+          <a:lnRef idx="1">
+            <a:schemeClr val="accent1"/>
+          </a:lnRef>
+          <a:fillRef idx="0">
+            <a:schemeClr val="accent1"/>
+          </a:fillRef>
+          <a:effectRef idx="0">
+            <a:schemeClr val="accent1"/>
+          </a:effectRef>
+          <a:fontRef idx="minor">
+            <a:schemeClr val="tx1"/>
+          </a:fontRef>
+        </p:style>
+      </p:cxnSp>
+      <p:sp>
+        <p:nvSpPr>
+          <p:cNvPr id="85" name="TextBox 84">
+            <a:extLst>
+              <a:ext uri="{FF2B5EF4-FFF2-40B4-BE49-F238E27FC236}">
+                <a16:creationId xmlns:a16="http://schemas.microsoft.com/office/drawing/2014/main" id="{4C7AC33D-D9C9-460E-B2E0-AC9D6078F8A9}"/>
+              </a:ext>
+            </a:extLst>
+          </p:cNvPr>
+          <p:cNvSpPr txBox="1"/>
+          <p:nvPr/>
+        </p:nvSpPr>
+        <p:spPr>
+          <a:xfrm>
+            <a:off x="811141" y="4372094"/>
+            <a:ext cx="1662963" cy="369332"/>
+          </a:xfrm>
+          <a:prstGeom prst="rect">
+            <a:avLst/>
+          </a:prstGeom>
+          <a:noFill/>
+        </p:spPr>
+        <p:txBody>
+          <a:bodyPr wrap="square" rtlCol="0">
+            <a:spAutoFit/>
+          </a:bodyPr>
+          <a:lstStyle/>
+          <a:p>
+            <a:pPr algn="ctr"/>
+            <a:r>
+              <a:rPr lang="en-US"/>
+              <a:t>T_sat at P_atm</a:t>
+            </a:r>
+            <a:endParaRPr lang="en-IN"/>
+          </a:p>
+        </p:txBody>
+      </p:sp>
+      <p:cxnSp>
+        <p:nvCxnSpPr>
+          <p:cNvPr id="86" name="Straight Arrow Connector 85">
+            <a:extLst>
+              <a:ext uri="{FF2B5EF4-FFF2-40B4-BE49-F238E27FC236}">
+                <a16:creationId xmlns:a16="http://schemas.microsoft.com/office/drawing/2014/main" id="{3CD34DAB-B799-47CA-84A5-C74492B2C425}"/>
+              </a:ext>
+            </a:extLst>
+          </p:cNvPr>
+          <p:cNvCxnSpPr>
+            <a:cxnSpLocks/>
+          </p:cNvCxnSpPr>
+          <p:nvPr/>
+        </p:nvCxnSpPr>
+        <p:spPr>
+          <a:xfrm flipV="1">
+            <a:off x="2436775" y="3710493"/>
+            <a:ext cx="2023681" cy="12525"/>
+          </a:xfrm>
+          <a:prstGeom prst="straightConnector1">
+            <a:avLst/>
+          </a:prstGeom>
+          <a:ln w="38100">
+            <a:tailEnd type="triangle"/>
+          </a:ln>
+        </p:spPr>
+        <p:style>
+          <a:lnRef idx="1">
+            <a:schemeClr val="accent1"/>
+          </a:lnRef>
+          <a:fillRef idx="0">
+            <a:schemeClr val="accent1"/>
+          </a:fillRef>
+          <a:effectRef idx="0">
+            <a:schemeClr val="accent1"/>
+          </a:effectRef>
+          <a:fontRef idx="minor">
+            <a:schemeClr val="tx1"/>
+          </a:fontRef>
+        </p:style>
+      </p:cxnSp>
+      <p:sp>
+        <p:nvSpPr>
+          <p:cNvPr id="87" name="TextBox 86">
+            <a:extLst>
+              <a:ext uri="{FF2B5EF4-FFF2-40B4-BE49-F238E27FC236}">
+                <a16:creationId xmlns:a16="http://schemas.microsoft.com/office/drawing/2014/main" id="{23DD4E18-894F-45FB-9501-195272ECCCEC}"/>
+              </a:ext>
+            </a:extLst>
+          </p:cNvPr>
+          <p:cNvSpPr txBox="1"/>
+          <p:nvPr/>
+        </p:nvSpPr>
+        <p:spPr>
+          <a:xfrm>
+            <a:off x="707568" y="3523111"/>
+            <a:ext cx="1810690" cy="369332"/>
+          </a:xfrm>
+          <a:prstGeom prst="rect">
+            <a:avLst/>
+          </a:prstGeom>
+          <a:noFill/>
+        </p:spPr>
+        <p:txBody>
+          <a:bodyPr wrap="square" rtlCol="0">
+            <a:spAutoFit/>
+          </a:bodyPr>
+          <a:lstStyle/>
+          <a:p>
+            <a:pPr algn="ctr"/>
+            <a:r>
+              <a:rPr lang="en-US"/>
+              <a:t>T_sat at P_10bar</a:t>
+            </a:r>
+            <a:endParaRPr lang="en-IN"/>
+          </a:p>
+        </p:txBody>
+      </p:sp>
+    </p:spTree>
+    <p:extLst>
+      <p:ext uri="{BB962C8B-B14F-4D97-AF65-F5344CB8AC3E}">
+        <p14:creationId xmlns:p14="http://schemas.microsoft.com/office/powerpoint/2010/main" val="1890809676"/>
+      </p:ext>
+    </p:extLst>
+  </p:cSld>
+  <p:clrMapOvr>
+    <a:masterClrMapping/>
+  </p:clrMapOvr>
+</p:sld>
+</file>
+
 <file path=ppt/theme/theme1.xml><?xml version="1.0" encoding="utf-8"?>
 <a:theme xmlns:a="http://schemas.openxmlformats.org/drawingml/2006/main" name="Office Theme">
   <a:themeElements>

</xml_diff>